<commit_message>
13:41:32.38 / 2025/01/13 周一
</commit_message>
<xml_diff>
--- a/演示文稿1.pptx
+++ b/演示文稿1.pptx
@@ -4659,6 +4659,74 @@
           </p:sp>
         </p:grpSp>
       </p:grpSp>
+      <p:cxnSp>
+        <p:nvCxnSpPr>
+          <p:cNvPr id="2" name="直接箭头连接符 1"/>
+          <p:cNvCxnSpPr>
+            <a:endCxn id="7" idx="3"/>
+          </p:cNvCxnSpPr>
+          <p:nvPr/>
+        </p:nvCxnSpPr>
+        <p:spPr>
+          <a:xfrm flipH="1" flipV="1">
+            <a:off x="5324475" y="2640965"/>
+            <a:ext cx="4782185" cy="3442335"/>
+          </a:xfrm>
+          <a:prstGeom prst="straightConnector1">
+            <a:avLst/>
+          </a:prstGeom>
+          <a:ln w="19050">
+            <a:solidFill>
+              <a:schemeClr val="tx1"/>
+            </a:solidFill>
+            <a:tailEnd type="arrow" w="med" len="med"/>
+          </a:ln>
+        </p:spPr>
+        <p:style>
+          <a:lnRef idx="2">
+            <a:schemeClr val="accent1"/>
+          </a:lnRef>
+          <a:fillRef idx="0">
+            <a:srgbClr val="FFFFFF"/>
+          </a:fillRef>
+          <a:effectRef idx="0">
+            <a:srgbClr val="FFFFFF"/>
+          </a:effectRef>
+          <a:fontRef idx="minor">
+            <a:schemeClr val="tx1"/>
+          </a:fontRef>
+        </p:style>
+      </p:cxnSp>
+      <p:sp>
+        <p:nvSpPr>
+          <p:cNvPr id="3" name="文本框 2"/>
+          <p:cNvSpPr txBox="1"/>
+          <p:nvPr/>
+        </p:nvSpPr>
+        <p:spPr>
+          <a:xfrm rot="2160000">
+            <a:off x="7026275" y="3832225"/>
+            <a:ext cx="1098550" cy="368300"/>
+          </a:xfrm>
+          <a:prstGeom prst="rect">
+            <a:avLst/>
+          </a:prstGeom>
+          <a:noFill/>
+        </p:spPr>
+        <p:txBody>
+          <a:bodyPr wrap="square" rtlCol="0">
+            <a:spAutoFit/>
+          </a:bodyPr>
+          <a:p>
+            <a:pPr algn="ctr"/>
+            <a:r>
+              <a:rPr lang="en-US" altLang="zh-CN"/>
+              <a:t>supports</a:t>
+            </a:r>
+            <a:endParaRPr lang="en-US" altLang="zh-CN"/>
+          </a:p>
+        </p:txBody>
+      </p:sp>
     </p:spTree>
     <p:custDataLst>
       <p:tags r:id="rId1"/>

</xml_diff>